<commit_message>
Responses to reflective pauses for Organizational Culture tutorial through slide 31
</commit_message>
<xml_diff>
--- a/Tutorials/POLS6320_2020_Spring_Tutorial03b_Organizational-Culture.pptx
+++ b/Tutorials/POLS6320_2020_Spring_Tutorial03b_Organizational-Culture.pptx
@@ -1021,7 +1021,7 @@
           <a:p>
             <a:fld id="{88830A07-04A8-4E2A-BFED-6F8EA0CB2FDA}" type="datetimeFigureOut">
               <a:rPr lang="en-US" smtClean="0"/>
-              <a:t>2/23/2020</a:t>
+              <a:t>3/9/2020</a:t>
             </a:fld>
             <a:endParaRPr lang="en-US"/>
           </a:p>
@@ -1881,7 +1881,7 @@
           <a:p>
             <a:fld id="{A03EE6C2-78FB-41CC-ADFA-AAFDD4BDF4F3}" type="datetimeFigureOut">
               <a:rPr lang="en-US" smtClean="0"/>
-              <a:t>2/23/2020</a:t>
+              <a:t>3/9/2020</a:t>
             </a:fld>
             <a:endParaRPr lang="en-US"/>
           </a:p>
@@ -2750,7 +2750,7 @@
           <a:p>
             <a:fld id="{805B8CE1-5C31-44C3-83CC-A5DC77C5623A}" type="datetimeFigureOut">
               <a:rPr lang="en-US" smtClean="0"/>
-              <a:t>2/23/2020</a:t>
+              <a:t>3/9/2020</a:t>
             </a:fld>
             <a:endParaRPr lang="en-US"/>
           </a:p>
@@ -2918,7 +2918,7 @@
           <a:p>
             <a:fld id="{805B8CE1-5C31-44C3-83CC-A5DC77C5623A}" type="datetimeFigureOut">
               <a:rPr lang="en-US" smtClean="0"/>
-              <a:t>2/23/2020</a:t>
+              <a:t>3/9/2020</a:t>
             </a:fld>
             <a:endParaRPr lang="en-US"/>
           </a:p>
@@ -3096,7 +3096,7 @@
           <a:p>
             <a:fld id="{805B8CE1-5C31-44C3-83CC-A5DC77C5623A}" type="datetimeFigureOut">
               <a:rPr lang="en-US" smtClean="0"/>
-              <a:t>2/23/2020</a:t>
+              <a:t>3/9/2020</a:t>
             </a:fld>
             <a:endParaRPr lang="en-US"/>
           </a:p>
@@ -3264,7 +3264,7 @@
           <a:p>
             <a:fld id="{805B8CE1-5C31-44C3-83CC-A5DC77C5623A}" type="datetimeFigureOut">
               <a:rPr lang="en-US" smtClean="0"/>
-              <a:t>2/23/2020</a:t>
+              <a:t>3/9/2020</a:t>
             </a:fld>
             <a:endParaRPr lang="en-US"/>
           </a:p>
@@ -3509,7 +3509,7 @@
           <a:p>
             <a:fld id="{805B8CE1-5C31-44C3-83CC-A5DC77C5623A}" type="datetimeFigureOut">
               <a:rPr lang="en-US" smtClean="0"/>
-              <a:t>2/23/2020</a:t>
+              <a:t>3/9/2020</a:t>
             </a:fld>
             <a:endParaRPr lang="en-US"/>
           </a:p>
@@ -3794,7 +3794,7 @@
           <a:p>
             <a:fld id="{805B8CE1-5C31-44C3-83CC-A5DC77C5623A}" type="datetimeFigureOut">
               <a:rPr lang="en-US" smtClean="0"/>
-              <a:t>2/23/2020</a:t>
+              <a:t>3/9/2020</a:t>
             </a:fld>
             <a:endParaRPr lang="en-US"/>
           </a:p>
@@ -4213,7 +4213,7 @@
           <a:p>
             <a:fld id="{805B8CE1-5C31-44C3-83CC-A5DC77C5623A}" type="datetimeFigureOut">
               <a:rPr lang="en-US" smtClean="0"/>
-              <a:t>2/23/2020</a:t>
+              <a:t>3/9/2020</a:t>
             </a:fld>
             <a:endParaRPr lang="en-US"/>
           </a:p>
@@ -4330,7 +4330,7 @@
           <a:p>
             <a:fld id="{805B8CE1-5C31-44C3-83CC-A5DC77C5623A}" type="datetimeFigureOut">
               <a:rPr lang="en-US" smtClean="0"/>
-              <a:t>2/23/2020</a:t>
+              <a:t>3/9/2020</a:t>
             </a:fld>
             <a:endParaRPr lang="en-US"/>
           </a:p>
@@ -4425,7 +4425,7 @@
           <a:p>
             <a:fld id="{805B8CE1-5C31-44C3-83CC-A5DC77C5623A}" type="datetimeFigureOut">
               <a:rPr lang="en-US" smtClean="0"/>
-              <a:t>2/23/2020</a:t>
+              <a:t>3/9/2020</a:t>
             </a:fld>
             <a:endParaRPr lang="en-US"/>
           </a:p>
@@ -4700,7 +4700,7 @@
           <a:p>
             <a:fld id="{805B8CE1-5C31-44C3-83CC-A5DC77C5623A}" type="datetimeFigureOut">
               <a:rPr lang="en-US" smtClean="0"/>
-              <a:t>2/23/2020</a:t>
+              <a:t>3/9/2020</a:t>
             </a:fld>
             <a:endParaRPr lang="en-US"/>
           </a:p>
@@ -4952,7 +4952,7 @@
           <a:p>
             <a:fld id="{805B8CE1-5C31-44C3-83CC-A5DC77C5623A}" type="datetimeFigureOut">
               <a:rPr lang="en-US" smtClean="0"/>
-              <a:t>2/23/2020</a:t>
+              <a:t>3/9/2020</a:t>
             </a:fld>
             <a:endParaRPr lang="en-US"/>
           </a:p>
@@ -5163,7 +5163,7 @@
           <a:p>
             <a:fld id="{805B8CE1-5C31-44C3-83CC-A5DC77C5623A}" type="datetimeFigureOut">
               <a:rPr lang="en-US" smtClean="0"/>
-              <a:t>2/23/2020</a:t>
+              <a:t>3/9/2020</a:t>
             </a:fld>
             <a:endParaRPr lang="en-US"/>
           </a:p>

</xml_diff>